<commit_message>
Minor tweaks following CI session
</commit_message>
<xml_diff>
--- a/Source Control/Source Control.pptx
+++ b/Source Control/Source Control.pptx
@@ -5,7 +5,7 @@
     <p:sldMasterId id="2147483660" r:id="rId1"/>
   </p:sldMasterIdLst>
   <p:notesMasterIdLst>
-    <p:notesMasterId r:id="rId21"/>
+    <p:notesMasterId r:id="rId22"/>
   </p:notesMasterIdLst>
   <p:sldIdLst>
     <p:sldId id="256" r:id="rId2"/>
@@ -26,7 +26,8 @@
     <p:sldId id="268" r:id="rId17"/>
     <p:sldId id="264" r:id="rId18"/>
     <p:sldId id="273" r:id="rId19"/>
-    <p:sldId id="274" r:id="rId20"/>
+    <p:sldId id="275" r:id="rId20"/>
+    <p:sldId id="274" r:id="rId21"/>
   </p:sldIdLst>
   <p:sldSz cx="12192000" cy="6858000"/>
   <p:notesSz cx="6858000" cy="9144000"/>
@@ -3087,7 +3088,7 @@
           <a:p>
             <a:fld id="{5560BEC4-70C4-46E6-ACDA-52986CED62C9}" type="datetimeFigureOut">
               <a:rPr lang="en-GB" smtClean="0"/>
-              <a:t>25/02/2019</a:t>
+              <a:t>15/05/2019</a:t>
             </a:fld>
             <a:endParaRPr lang="en-GB"/>
           </a:p>
@@ -3862,6 +3863,269 @@
     <p:extLst>
       <p:ext uri="{BB962C8B-B14F-4D97-AF65-F5344CB8AC3E}">
         <p14:creationId xmlns:p14="http://schemas.microsoft.com/office/powerpoint/2010/main" val="3473427176"/>
+      </p:ext>
+    </p:extLst>
+  </p:cSld>
+  <p:clrMapOvr>
+    <a:masterClrMapping/>
+  </p:clrMapOvr>
+</p:notes>
+</file>
+
+<file path=ppt/notesSlides/notesSlide5.xml><?xml version="1.0" encoding="utf-8"?>
+<p:notes xmlns:a="http://schemas.openxmlformats.org/drawingml/2006/main" xmlns:r="http://schemas.openxmlformats.org/officeDocument/2006/relationships" xmlns:p="http://schemas.openxmlformats.org/presentationml/2006/main">
+  <p:cSld>
+    <p:spTree>
+      <p:nvGrpSpPr>
+        <p:cNvPr id="1" name=""/>
+        <p:cNvGrpSpPr/>
+        <p:nvPr/>
+      </p:nvGrpSpPr>
+      <p:grpSpPr>
+        <a:xfrm>
+          <a:off x="0" y="0"/>
+          <a:ext cx="0" cy="0"/>
+          <a:chOff x="0" y="0"/>
+          <a:chExt cx="0" cy="0"/>
+        </a:xfrm>
+      </p:grpSpPr>
+      <p:sp>
+        <p:nvSpPr>
+          <p:cNvPr id="2" name="Slide Image Placeholder 1"/>
+          <p:cNvSpPr>
+            <a:spLocks noGrp="1" noRot="1" noChangeAspect="1"/>
+          </p:cNvSpPr>
+          <p:nvPr>
+            <p:ph type="sldImg"/>
+          </p:nvPr>
+        </p:nvSpPr>
+        <p:spPr/>
+      </p:sp>
+      <p:sp>
+        <p:nvSpPr>
+          <p:cNvPr id="3" name="Notes Placeholder 2"/>
+          <p:cNvSpPr>
+            <a:spLocks noGrp="1"/>
+          </p:cNvSpPr>
+          <p:nvPr>
+            <p:ph type="body" idx="1"/>
+          </p:nvPr>
+        </p:nvSpPr>
+        <p:spPr/>
+        <p:txBody>
+          <a:bodyPr/>
+          <a:lstStyle/>
+          <a:p>
+            <a:r>
+              <a:rPr lang="en-GB" dirty="0"/>
+              <a:t>Branching &lt;&gt; Forking</a:t>
+            </a:r>
+          </a:p>
+          <a:p>
+            <a:pPr fontAlgn="base"/>
+            <a:r>
+              <a:rPr lang="en-US" sz="1200" b="0" i="0" kern="1200" dirty="0">
+                <a:solidFill>
+                  <a:schemeClr val="tx1"/>
+                </a:solidFill>
+                <a:effectLst/>
+                <a:latin typeface="+mn-lt"/>
+                <a:ea typeface="+mn-ea"/>
+                <a:cs typeface="+mn-cs"/>
+              </a:rPr>
+              <a:t>All branches on GitHub will be copied in a fork. (Obviously, this doesn’t include branches that were never pushed to GitHub in the first place.)</a:t>
+            </a:r>
+          </a:p>
+          <a:p>
+            <a:pPr fontAlgn="base"/>
+            <a:r>
+              <a:rPr lang="en-US" sz="1200" b="0" i="0" kern="1200" dirty="0">
+                <a:solidFill>
+                  <a:schemeClr val="tx1"/>
+                </a:solidFill>
+                <a:effectLst/>
+                <a:latin typeface="+mn-lt"/>
+                <a:ea typeface="+mn-ea"/>
+                <a:cs typeface="+mn-cs"/>
+              </a:rPr>
+              <a:t>But a fork is a GitHub-to-GitHub operation; nothing is copied to your PC. It’s not quite the same as a Git </a:t>
+            </a:r>
+            <a:r>
+              <a:rPr lang="en-US" sz="1200" b="0" i="1" kern="1200" dirty="0">
+                <a:solidFill>
+                  <a:schemeClr val="tx1"/>
+                </a:solidFill>
+                <a:effectLst/>
+                <a:latin typeface="+mn-lt"/>
+                <a:ea typeface="+mn-ea"/>
+                <a:cs typeface="+mn-cs"/>
+              </a:rPr>
+              <a:t>clone</a:t>
+            </a:r>
+            <a:r>
+              <a:rPr lang="en-US" sz="1200" b="0" i="0" kern="1200" dirty="0">
+                <a:solidFill>
+                  <a:schemeClr val="tx1"/>
+                </a:solidFill>
+                <a:effectLst/>
+                <a:latin typeface="+mn-lt"/>
+                <a:ea typeface="+mn-ea"/>
+                <a:cs typeface="+mn-cs"/>
+              </a:rPr>
+              <a:t>. If you mean to ask “what’s copied when I clone a project?”, see the manual for </a:t>
+            </a:r>
+            <a:r>
+              <a:rPr lang="en-US" sz="1200" b="0" i="0" u="sng" kern="1200" dirty="0">
+                <a:solidFill>
+                  <a:schemeClr val="tx1"/>
+                </a:solidFill>
+                <a:effectLst/>
+                <a:latin typeface="+mn-lt"/>
+                <a:ea typeface="+mn-ea"/>
+                <a:cs typeface="+mn-cs"/>
+                <a:hlinkClick r:id="rId3"/>
+              </a:rPr>
+              <a:t>git-clone(1)</a:t>
+            </a:r>
+            <a:r>
+              <a:rPr lang="en-US" sz="1200" b="0" i="0" kern="1200" dirty="0">
+                <a:solidFill>
+                  <a:schemeClr val="tx1"/>
+                </a:solidFill>
+                <a:effectLst/>
+                <a:latin typeface="+mn-lt"/>
+                <a:ea typeface="+mn-ea"/>
+                <a:cs typeface="+mn-cs"/>
+              </a:rPr>
+              <a:t>.</a:t>
+            </a:r>
+          </a:p>
+          <a:p>
+            <a:r>
+              <a:rPr lang="en-GB" dirty="0"/>
+              <a:t>Credit: </a:t>
+            </a:r>
+            <a:r>
+              <a:rPr lang="en-GB" dirty="0">
+                <a:hlinkClick r:id="rId4"/>
+              </a:rPr>
+              <a:t>https://stackoverflow.com/questions/5009600/difference-between-fork-and-branch-on-github</a:t>
+            </a:r>
+            <a:endParaRPr lang="en-GB" dirty="0"/>
+          </a:p>
+        </p:txBody>
+      </p:sp>
+      <p:sp>
+        <p:nvSpPr>
+          <p:cNvPr id="4" name="Slide Number Placeholder 3"/>
+          <p:cNvSpPr>
+            <a:spLocks noGrp="1"/>
+          </p:cNvSpPr>
+          <p:nvPr>
+            <p:ph type="sldNum" sz="quarter" idx="5"/>
+          </p:nvPr>
+        </p:nvSpPr>
+        <p:spPr/>
+        <p:txBody>
+          <a:bodyPr/>
+          <a:lstStyle/>
+          <a:p>
+            <a:fld id="{66E1252E-F4FC-414B-9272-802B24747CE9}" type="slidenum">
+              <a:rPr lang="en-GB" smtClean="0"/>
+              <a:t>18</a:t>
+            </a:fld>
+            <a:endParaRPr lang="en-GB"/>
+          </a:p>
+        </p:txBody>
+      </p:sp>
+    </p:spTree>
+    <p:extLst>
+      <p:ext uri="{BB962C8B-B14F-4D97-AF65-F5344CB8AC3E}">
+        <p14:creationId xmlns:p14="http://schemas.microsoft.com/office/powerpoint/2010/main" val="2393485840"/>
+      </p:ext>
+    </p:extLst>
+  </p:cSld>
+  <p:clrMapOvr>
+    <a:masterClrMapping/>
+  </p:clrMapOvr>
+</p:notes>
+</file>
+
+<file path=ppt/notesSlides/notesSlide6.xml><?xml version="1.0" encoding="utf-8"?>
+<p:notes xmlns:a="http://schemas.openxmlformats.org/drawingml/2006/main" xmlns:r="http://schemas.openxmlformats.org/officeDocument/2006/relationships" xmlns:p="http://schemas.openxmlformats.org/presentationml/2006/main">
+  <p:cSld>
+    <p:spTree>
+      <p:nvGrpSpPr>
+        <p:cNvPr id="1" name=""/>
+        <p:cNvGrpSpPr/>
+        <p:nvPr/>
+      </p:nvGrpSpPr>
+      <p:grpSpPr>
+        <a:xfrm>
+          <a:off x="0" y="0"/>
+          <a:ext cx="0" cy="0"/>
+          <a:chOff x="0" y="0"/>
+          <a:chExt cx="0" cy="0"/>
+        </a:xfrm>
+      </p:grpSpPr>
+      <p:sp>
+        <p:nvSpPr>
+          <p:cNvPr id="2" name="Slide Image Placeholder 1"/>
+          <p:cNvSpPr>
+            <a:spLocks noGrp="1" noRot="1" noChangeAspect="1"/>
+          </p:cNvSpPr>
+          <p:nvPr>
+            <p:ph type="sldImg"/>
+          </p:nvPr>
+        </p:nvSpPr>
+        <p:spPr/>
+      </p:sp>
+      <p:sp>
+        <p:nvSpPr>
+          <p:cNvPr id="3" name="Notes Placeholder 2"/>
+          <p:cNvSpPr>
+            <a:spLocks noGrp="1"/>
+          </p:cNvSpPr>
+          <p:nvPr>
+            <p:ph type="body" idx="1"/>
+          </p:nvPr>
+        </p:nvSpPr>
+        <p:spPr/>
+        <p:txBody>
+          <a:bodyPr/>
+          <a:lstStyle/>
+          <a:p>
+            <a:endParaRPr lang="en-GB" dirty="0"/>
+          </a:p>
+        </p:txBody>
+      </p:sp>
+      <p:sp>
+        <p:nvSpPr>
+          <p:cNvPr id="4" name="Slide Number Placeholder 3"/>
+          <p:cNvSpPr>
+            <a:spLocks noGrp="1"/>
+          </p:cNvSpPr>
+          <p:nvPr>
+            <p:ph type="sldNum" sz="quarter" idx="5"/>
+          </p:nvPr>
+        </p:nvSpPr>
+        <p:spPr/>
+        <p:txBody>
+          <a:bodyPr/>
+          <a:lstStyle/>
+          <a:p>
+            <a:fld id="{66E1252E-F4FC-414B-9272-802B24747CE9}" type="slidenum">
+              <a:rPr lang="en-GB" smtClean="0"/>
+              <a:t>19</a:t>
+            </a:fld>
+            <a:endParaRPr lang="en-GB"/>
+          </a:p>
+        </p:txBody>
+      </p:sp>
+    </p:spTree>
+    <p:extLst>
+      <p:ext uri="{BB962C8B-B14F-4D97-AF65-F5344CB8AC3E}">
+        <p14:creationId xmlns:p14="http://schemas.microsoft.com/office/powerpoint/2010/main" val="2932082274"/>
       </p:ext>
     </p:extLst>
   </p:cSld>
@@ -4593,7 +4857,7 @@
           <a:p>
             <a:fld id="{52ED9D7E-CC4E-4410-8C79-A2EA187E87F2}" type="datetimeFigureOut">
               <a:rPr lang="en-GB" smtClean="0"/>
-              <a:t>25/02/2019</a:t>
+              <a:t>15/05/2019</a:t>
             </a:fld>
             <a:endParaRPr lang="en-GB"/>
           </a:p>
@@ -4844,7 +5108,7 @@
           <a:p>
             <a:fld id="{52ED9D7E-CC4E-4410-8C79-A2EA187E87F2}" type="datetimeFigureOut">
               <a:rPr lang="en-GB" smtClean="0"/>
-              <a:t>25/02/2019</a:t>
+              <a:t>15/05/2019</a:t>
             </a:fld>
             <a:endParaRPr lang="en-GB"/>
           </a:p>
@@ -5158,7 +5422,7 @@
           <a:p>
             <a:fld id="{52ED9D7E-CC4E-4410-8C79-A2EA187E87F2}" type="datetimeFigureOut">
               <a:rPr lang="en-GB" smtClean="0"/>
-              <a:t>25/02/2019</a:t>
+              <a:t>15/05/2019</a:t>
             </a:fld>
             <a:endParaRPr lang="en-GB"/>
           </a:p>
@@ -5499,7 +5763,7 @@
           <a:p>
             <a:fld id="{52ED9D7E-CC4E-4410-8C79-A2EA187E87F2}" type="datetimeFigureOut">
               <a:rPr lang="en-GB" smtClean="0"/>
-              <a:t>25/02/2019</a:t>
+              <a:t>15/05/2019</a:t>
             </a:fld>
             <a:endParaRPr lang="en-GB"/>
           </a:p>
@@ -5813,7 +6077,7 @@
           <a:p>
             <a:fld id="{52ED9D7E-CC4E-4410-8C79-A2EA187E87F2}" type="datetimeFigureOut">
               <a:rPr lang="en-GB" smtClean="0"/>
-              <a:t>25/02/2019</a:t>
+              <a:t>15/05/2019</a:t>
             </a:fld>
             <a:endParaRPr lang="en-GB"/>
           </a:p>
@@ -6206,7 +6470,7 @@
           <a:p>
             <a:fld id="{52ED9D7E-CC4E-4410-8C79-A2EA187E87F2}" type="datetimeFigureOut">
               <a:rPr lang="en-GB" smtClean="0"/>
-              <a:t>25/02/2019</a:t>
+              <a:t>15/05/2019</a:t>
             </a:fld>
             <a:endParaRPr lang="en-GB"/>
           </a:p>
@@ -6376,7 +6640,7 @@
           <a:p>
             <a:fld id="{52ED9D7E-CC4E-4410-8C79-A2EA187E87F2}" type="datetimeFigureOut">
               <a:rPr lang="en-GB" smtClean="0"/>
-              <a:t>25/02/2019</a:t>
+              <a:t>15/05/2019</a:t>
             </a:fld>
             <a:endParaRPr lang="en-GB"/>
           </a:p>
@@ -6556,7 +6820,7 @@
           <a:p>
             <a:fld id="{52ED9D7E-CC4E-4410-8C79-A2EA187E87F2}" type="datetimeFigureOut">
               <a:rPr lang="en-GB" smtClean="0"/>
-              <a:t>25/02/2019</a:t>
+              <a:t>15/05/2019</a:t>
             </a:fld>
             <a:endParaRPr lang="en-GB"/>
           </a:p>
@@ -6732,7 +6996,7 @@
           <a:p>
             <a:fld id="{52ED9D7E-CC4E-4410-8C79-A2EA187E87F2}" type="datetimeFigureOut">
               <a:rPr lang="en-GB" smtClean="0"/>
-              <a:t>25/02/2019</a:t>
+              <a:t>15/05/2019</a:t>
             </a:fld>
             <a:endParaRPr lang="en-GB"/>
           </a:p>
@@ -6979,7 +7243,7 @@
           <a:p>
             <a:fld id="{52ED9D7E-CC4E-4410-8C79-A2EA187E87F2}" type="datetimeFigureOut">
               <a:rPr lang="en-GB" smtClean="0"/>
-              <a:t>25/02/2019</a:t>
+              <a:t>15/05/2019</a:t>
             </a:fld>
             <a:endParaRPr lang="en-GB"/>
           </a:p>
@@ -7211,7 +7475,7 @@
           <a:p>
             <a:fld id="{52ED9D7E-CC4E-4410-8C79-A2EA187E87F2}" type="datetimeFigureOut">
               <a:rPr lang="en-GB" smtClean="0"/>
-              <a:t>25/02/2019</a:t>
+              <a:t>15/05/2019</a:t>
             </a:fld>
             <a:endParaRPr lang="en-GB"/>
           </a:p>
@@ -7585,7 +7849,7 @@
           <a:p>
             <a:fld id="{52ED9D7E-CC4E-4410-8C79-A2EA187E87F2}" type="datetimeFigureOut">
               <a:rPr lang="en-GB" smtClean="0"/>
-              <a:t>25/02/2019</a:t>
+              <a:t>15/05/2019</a:t>
             </a:fld>
             <a:endParaRPr lang="en-GB"/>
           </a:p>
@@ -7708,7 +7972,7 @@
           <a:p>
             <a:fld id="{52ED9D7E-CC4E-4410-8C79-A2EA187E87F2}" type="datetimeFigureOut">
               <a:rPr lang="en-GB" smtClean="0"/>
-              <a:t>25/02/2019</a:t>
+              <a:t>15/05/2019</a:t>
             </a:fld>
             <a:endParaRPr lang="en-GB"/>
           </a:p>
@@ -7803,7 +8067,7 @@
           <a:p>
             <a:fld id="{52ED9D7E-CC4E-4410-8C79-A2EA187E87F2}" type="datetimeFigureOut">
               <a:rPr lang="en-GB" smtClean="0"/>
-              <a:t>25/02/2019</a:t>
+              <a:t>15/05/2019</a:t>
             </a:fld>
             <a:endParaRPr lang="en-GB"/>
           </a:p>
@@ -8058,7 +8322,7 @@
           <a:p>
             <a:fld id="{52ED9D7E-CC4E-4410-8C79-A2EA187E87F2}" type="datetimeFigureOut">
               <a:rPr lang="en-GB" smtClean="0"/>
-              <a:t>25/02/2019</a:t>
+              <a:t>15/05/2019</a:t>
             </a:fld>
             <a:endParaRPr lang="en-GB"/>
           </a:p>
@@ -8321,7 +8585,7 @@
           <a:p>
             <a:fld id="{52ED9D7E-CC4E-4410-8C79-A2EA187E87F2}" type="datetimeFigureOut">
               <a:rPr lang="en-GB" smtClean="0"/>
-              <a:t>25/02/2019</a:t>
+              <a:t>15/05/2019</a:t>
             </a:fld>
             <a:endParaRPr lang="en-GB"/>
           </a:p>
@@ -9064,7 +9328,7 @@
           <a:p>
             <a:fld id="{52ED9D7E-CC4E-4410-8C79-A2EA187E87F2}" type="datetimeFigureOut">
               <a:rPr lang="en-GB" smtClean="0"/>
-              <a:t>25/02/2019</a:t>
+              <a:t>15/05/2019</a:t>
             </a:fld>
             <a:endParaRPr lang="en-GB"/>
           </a:p>
@@ -9650,7 +9914,15 @@
           <a:p>
             <a:r>
               <a:rPr lang="en-GB" dirty="0"/>
-              <a:t>Simon Stride Feb 2019</a:t>
+              <a:t>Simon </a:t>
+            </a:r>
+            <a:r>
+              <a:rPr lang="en-GB"/>
+              <a:t>Stride May </a:t>
+            </a:r>
+            <a:r>
+              <a:rPr lang="en-GB" dirty="0"/>
+              <a:t>2019</a:t>
             </a:r>
           </a:p>
         </p:txBody>
@@ -11608,7 +11880,7 @@
           <p:cNvPr id="2" name="Title 1">
             <a:extLst>
               <a:ext uri="{FF2B5EF4-FFF2-40B4-BE49-F238E27FC236}">
-                <a16:creationId xmlns:a16="http://schemas.microsoft.com/office/drawing/2014/main" id="{99DAD959-A692-41FE-BBE9-E96A128908FA}"/>
+                <a16:creationId xmlns:a16="http://schemas.microsoft.com/office/drawing/2014/main" id="{663B0D9C-6172-407E-91A5-C32346F784CA}"/>
               </a:ext>
             </a:extLst>
           </p:cNvPr>
@@ -11626,7 +11898,7 @@
           <a:p>
             <a:r>
               <a:rPr lang="en-GB" dirty="0"/>
-              <a:t>Questions</a:t>
+              <a:t>Pull Requests</a:t>
             </a:r>
           </a:p>
         </p:txBody>
@@ -11636,7 +11908,7 @@
           <p:cNvPr id="3" name="Content Placeholder 2">
             <a:extLst>
               <a:ext uri="{FF2B5EF4-FFF2-40B4-BE49-F238E27FC236}">
-                <a16:creationId xmlns:a16="http://schemas.microsoft.com/office/drawing/2014/main" id="{B26176BD-3EDF-4495-83AC-B2DECE1A06D5}"/>
+                <a16:creationId xmlns:a16="http://schemas.microsoft.com/office/drawing/2014/main" id="{77326BF3-1A8A-4F4E-94A9-86D6D1F37EF8}"/>
               </a:ext>
             </a:extLst>
           </p:cNvPr>
@@ -11653,16 +11925,23 @@
           <a:lstStyle/>
           <a:p>
             <a:r>
-              <a:rPr lang="en-GB" dirty="0"/>
-              <a:t>?</a:t>
-            </a:r>
+              <a:rPr lang="en-US" dirty="0"/>
+              <a:t>Pull requests let you tell others about changes you've pushed to a branch in a repository on GitHub. </a:t>
+            </a:r>
+          </a:p>
+          <a:p>
+            <a:r>
+              <a:rPr lang="en-US" dirty="0"/>
+              <a:t>Once a pull request is opened, you can discuss and review the potential changes with collaborators and add follow-up commits before your changes are merged into the base branch.</a:t>
+            </a:r>
+            <a:endParaRPr lang="en-GB" dirty="0"/>
           </a:p>
         </p:txBody>
       </p:sp>
     </p:spTree>
     <p:extLst>
       <p:ext uri="{BB962C8B-B14F-4D97-AF65-F5344CB8AC3E}">
-        <p14:creationId xmlns:p14="http://schemas.microsoft.com/office/powerpoint/2010/main" val="2382965784"/>
+        <p14:creationId xmlns:p14="http://schemas.microsoft.com/office/powerpoint/2010/main" val="3991996186"/>
       </p:ext>
     </p:extLst>
   </p:cSld>
@@ -11796,6 +12075,92 @@
     <p:extLst>
       <p:ext uri="{BB962C8B-B14F-4D97-AF65-F5344CB8AC3E}">
         <p14:creationId xmlns:p14="http://schemas.microsoft.com/office/powerpoint/2010/main" val="1190265790"/>
+      </p:ext>
+    </p:extLst>
+  </p:cSld>
+  <p:clrMapOvr>
+    <a:masterClrMapping/>
+  </p:clrMapOvr>
+</p:sld>
+</file>
+
+<file path=ppt/slides/slide20.xml><?xml version="1.0" encoding="utf-8"?>
+<p:sld xmlns:a="http://schemas.openxmlformats.org/drawingml/2006/main" xmlns:r="http://schemas.openxmlformats.org/officeDocument/2006/relationships" xmlns:p="http://schemas.openxmlformats.org/presentationml/2006/main">
+  <p:cSld>
+    <p:spTree>
+      <p:nvGrpSpPr>
+        <p:cNvPr id="1" name=""/>
+        <p:cNvGrpSpPr/>
+        <p:nvPr/>
+      </p:nvGrpSpPr>
+      <p:grpSpPr>
+        <a:xfrm>
+          <a:off x="0" y="0"/>
+          <a:ext cx="0" cy="0"/>
+          <a:chOff x="0" y="0"/>
+          <a:chExt cx="0" cy="0"/>
+        </a:xfrm>
+      </p:grpSpPr>
+      <p:sp>
+        <p:nvSpPr>
+          <p:cNvPr id="2" name="Title 1">
+            <a:extLst>
+              <a:ext uri="{FF2B5EF4-FFF2-40B4-BE49-F238E27FC236}">
+                <a16:creationId xmlns:a16="http://schemas.microsoft.com/office/drawing/2014/main" id="{99DAD959-A692-41FE-BBE9-E96A128908FA}"/>
+              </a:ext>
+            </a:extLst>
+          </p:cNvPr>
+          <p:cNvSpPr>
+            <a:spLocks noGrp="1"/>
+          </p:cNvSpPr>
+          <p:nvPr>
+            <p:ph type="title"/>
+          </p:nvPr>
+        </p:nvSpPr>
+        <p:spPr/>
+        <p:txBody>
+          <a:bodyPr/>
+          <a:lstStyle/>
+          <a:p>
+            <a:r>
+              <a:rPr lang="en-GB" dirty="0"/>
+              <a:t>Questions</a:t>
+            </a:r>
+          </a:p>
+        </p:txBody>
+      </p:sp>
+      <p:sp>
+        <p:nvSpPr>
+          <p:cNvPr id="3" name="Content Placeholder 2">
+            <a:extLst>
+              <a:ext uri="{FF2B5EF4-FFF2-40B4-BE49-F238E27FC236}">
+                <a16:creationId xmlns:a16="http://schemas.microsoft.com/office/drawing/2014/main" id="{B26176BD-3EDF-4495-83AC-B2DECE1A06D5}"/>
+              </a:ext>
+            </a:extLst>
+          </p:cNvPr>
+          <p:cNvSpPr>
+            <a:spLocks noGrp="1"/>
+          </p:cNvSpPr>
+          <p:nvPr>
+            <p:ph idx="1"/>
+          </p:nvPr>
+        </p:nvSpPr>
+        <p:spPr/>
+        <p:txBody>
+          <a:bodyPr/>
+          <a:lstStyle/>
+          <a:p>
+            <a:r>
+              <a:rPr lang="en-GB" dirty="0"/>
+              <a:t>?</a:t>
+            </a:r>
+          </a:p>
+        </p:txBody>
+      </p:sp>
+    </p:spTree>
+    <p:extLst>
+      <p:ext uri="{BB962C8B-B14F-4D97-AF65-F5344CB8AC3E}">
+        <p14:creationId xmlns:p14="http://schemas.microsoft.com/office/powerpoint/2010/main" val="2382965784"/>
       </p:ext>
     </p:extLst>
   </p:cSld>

</xml_diff>